<commit_message>
write chapter 9:create file and commit
</commit_message>
<xml_diff>
--- a/pptx/chapter-9.pptx
+++ b/pptx/chapter-9.pptx
@@ -7,6 +7,7 @@
   <p:sldIdLst>
     <p:sldId id="266" r:id="rId2"/>
     <p:sldId id="267" r:id="rId3"/>
+    <p:sldId id="268" r:id="rId4"/>
   </p:sldIdLst>
   <p:sldSz cx="9144000" cy="6858000" type="screen4x3"/>
   <p:notesSz cx="6858000" cy="9144000"/>
@@ -244,7 +245,7 @@
           <a:p>
             <a:fld id="{07DD73A8-177D-4FF7-AF69-632B85FAD23A}" type="datetimeFigureOut">
               <a:rPr kumimoji="1" lang="ja-JP" altLang="en-US" smtClean="0"/>
-              <a:t>2013/6/10</a:t>
+              <a:t>2013/6/11</a:t>
             </a:fld>
             <a:endParaRPr kumimoji="1" lang="ja-JP" altLang="en-US"/>
           </a:p>
@@ -446,7 +447,7 @@
           <a:p>
             <a:fld id="{07DD73A8-177D-4FF7-AF69-632B85FAD23A}" type="datetimeFigureOut">
               <a:rPr kumimoji="1" lang="ja-JP" altLang="en-US" smtClean="0"/>
-              <a:t>2013/6/10</a:t>
+              <a:t>2013/6/11</a:t>
             </a:fld>
             <a:endParaRPr kumimoji="1" lang="ja-JP" altLang="en-US"/>
           </a:p>
@@ -658,7 +659,7 @@
           <a:p>
             <a:fld id="{07DD73A8-177D-4FF7-AF69-632B85FAD23A}" type="datetimeFigureOut">
               <a:rPr kumimoji="1" lang="ja-JP" altLang="en-US" smtClean="0"/>
-              <a:t>2013/6/10</a:t>
+              <a:t>2013/6/11</a:t>
             </a:fld>
             <a:endParaRPr kumimoji="1" lang="ja-JP" altLang="en-US"/>
           </a:p>
@@ -860,7 +861,7 @@
           <a:p>
             <a:fld id="{07DD73A8-177D-4FF7-AF69-632B85FAD23A}" type="datetimeFigureOut">
               <a:rPr kumimoji="1" lang="ja-JP" altLang="en-US" smtClean="0"/>
-              <a:t>2013/6/10</a:t>
+              <a:t>2013/6/11</a:t>
             </a:fld>
             <a:endParaRPr kumimoji="1" lang="ja-JP" altLang="en-US"/>
           </a:p>
@@ -1104,7 +1105,7 @@
           <a:p>
             <a:fld id="{07DD73A8-177D-4FF7-AF69-632B85FAD23A}" type="datetimeFigureOut">
               <a:rPr kumimoji="1" lang="ja-JP" altLang="en-US" smtClean="0"/>
-              <a:t>2013/6/10</a:t>
+              <a:t>2013/6/11</a:t>
             </a:fld>
             <a:endParaRPr kumimoji="1" lang="ja-JP" altLang="en-US"/>
           </a:p>
@@ -1400,7 +1401,7 @@
           <a:p>
             <a:fld id="{07DD73A8-177D-4FF7-AF69-632B85FAD23A}" type="datetimeFigureOut">
               <a:rPr kumimoji="1" lang="ja-JP" altLang="en-US" smtClean="0"/>
-              <a:t>2013/6/10</a:t>
+              <a:t>2013/6/11</a:t>
             </a:fld>
             <a:endParaRPr kumimoji="1" lang="ja-JP" altLang="en-US"/>
           </a:p>
@@ -1831,7 +1832,7 @@
           <a:p>
             <a:fld id="{07DD73A8-177D-4FF7-AF69-632B85FAD23A}" type="datetimeFigureOut">
               <a:rPr kumimoji="1" lang="ja-JP" altLang="en-US" smtClean="0"/>
-              <a:t>2013/6/10</a:t>
+              <a:t>2013/6/11</a:t>
             </a:fld>
             <a:endParaRPr kumimoji="1" lang="ja-JP" altLang="en-US"/>
           </a:p>
@@ -1949,7 +1950,7 @@
           <a:p>
             <a:fld id="{07DD73A8-177D-4FF7-AF69-632B85FAD23A}" type="datetimeFigureOut">
               <a:rPr kumimoji="1" lang="ja-JP" altLang="en-US" smtClean="0"/>
-              <a:t>2013/6/10</a:t>
+              <a:t>2013/6/11</a:t>
             </a:fld>
             <a:endParaRPr kumimoji="1" lang="ja-JP" altLang="en-US"/>
           </a:p>
@@ -2044,7 +2045,7 @@
           <a:p>
             <a:fld id="{07DD73A8-177D-4FF7-AF69-632B85FAD23A}" type="datetimeFigureOut">
               <a:rPr kumimoji="1" lang="ja-JP" altLang="en-US" smtClean="0"/>
-              <a:t>2013/6/10</a:t>
+              <a:t>2013/6/11</a:t>
             </a:fld>
             <a:endParaRPr kumimoji="1" lang="ja-JP" altLang="en-US"/>
           </a:p>
@@ -2353,7 +2354,7 @@
           <a:p>
             <a:fld id="{07DD73A8-177D-4FF7-AF69-632B85FAD23A}" type="datetimeFigureOut">
               <a:rPr kumimoji="1" lang="ja-JP" altLang="en-US" smtClean="0"/>
-              <a:t>2013/6/10</a:t>
+              <a:t>2013/6/11</a:t>
             </a:fld>
             <a:endParaRPr kumimoji="1" lang="ja-JP" altLang="en-US"/>
           </a:p>
@@ -2610,7 +2611,7 @@
           <a:p>
             <a:fld id="{07DD73A8-177D-4FF7-AF69-632B85FAD23A}" type="datetimeFigureOut">
               <a:rPr kumimoji="1" lang="ja-JP" altLang="en-US" smtClean="0"/>
-              <a:t>2013/6/10</a:t>
+              <a:t>2013/6/11</a:t>
             </a:fld>
             <a:endParaRPr kumimoji="1" lang="ja-JP" altLang="en-US"/>
           </a:p>
@@ -2855,7 +2856,7 @@
           <a:p>
             <a:fld id="{07DD73A8-177D-4FF7-AF69-632B85FAD23A}" type="datetimeFigureOut">
               <a:rPr kumimoji="1" lang="ja-JP" altLang="en-US" smtClean="0"/>
-              <a:t>2013/6/10</a:t>
+              <a:t>2013/6/11</a:t>
             </a:fld>
             <a:endParaRPr kumimoji="1" lang="ja-JP" altLang="en-US"/>
           </a:p>
@@ -3351,6 +3352,60 @@
 </p:sld>
 </file>
 
+<file path=ppt/slides/slide3.xml><?xml version="1.0" encoding="utf-8"?>
+<p:sld xmlns:a="http://schemas.openxmlformats.org/drawingml/2006/main" xmlns:r="http://schemas.openxmlformats.org/officeDocument/2006/relationships" xmlns:p="http://schemas.openxmlformats.org/presentationml/2006/main">
+  <p:cSld>
+    <p:spTree>
+      <p:nvGrpSpPr>
+        <p:cNvPr id="1" name=""/>
+        <p:cNvGrpSpPr/>
+        <p:nvPr/>
+      </p:nvGrpSpPr>
+      <p:grpSpPr>
+        <a:xfrm>
+          <a:off x="0" y="0"/>
+          <a:ext cx="0" cy="0"/>
+          <a:chOff x="0" y="0"/>
+          <a:chExt cx="0" cy="0"/>
+        </a:xfrm>
+      </p:grpSpPr>
+      <p:pic>
+        <p:nvPicPr>
+          <p:cNvPr id="2" name="図 1"/>
+          <p:cNvPicPr>
+            <a:picLocks noChangeAspect="1"/>
+          </p:cNvPicPr>
+          <p:nvPr/>
+        </p:nvPicPr>
+        <p:blipFill>
+          <a:blip r:embed="rId2"/>
+          <a:stretch>
+            <a:fillRect/>
+          </a:stretch>
+        </p:blipFill>
+        <p:spPr>
+          <a:xfrm>
+            <a:off x="1433905" y="1138524"/>
+            <a:ext cx="6276190" cy="4580952"/>
+          </a:xfrm>
+          <a:prstGeom prst="rect">
+            <a:avLst/>
+          </a:prstGeom>
+        </p:spPr>
+      </p:pic>
+    </p:spTree>
+    <p:extLst>
+      <p:ext uri="{BB962C8B-B14F-4D97-AF65-F5344CB8AC3E}">
+        <p14:creationId xmlns:p14="http://schemas.microsoft.com/office/powerpoint/2010/main" val="3257292666"/>
+      </p:ext>
+    </p:extLst>
+  </p:cSld>
+  <p:clrMapOvr>
+    <a:masterClrMapping/>
+  </p:clrMapOvr>
+</p:sld>
+</file>
+
 <file path=ppt/theme/theme1.xml><?xml version="1.0" encoding="utf-8"?>
 <a:theme xmlns:a="http://schemas.openxmlformats.org/drawingml/2006/main" name="Office テーマ">
   <a:themeElements>

</xml_diff>